<commit_message>
fix typos and add links
</commit_message>
<xml_diff>
--- a/lecture/lecture10_llcao.pptx
+++ b/lecture/lecture10_llcao.pptx
@@ -11209,6 +11209,13 @@
   <p:clrMapOvr>
     <a:masterClrMapping/>
   </p:clrMapOvr>
+  <p:timing>
+    <p:tnLst>
+      <p:par>
+        <p:cTn id="1" dur="indefinite" restart="never" nodeType="tmRoot"/>
+      </p:par>
+    </p:tnLst>
+  </p:timing>
 </p:sld>
 </file>
 
@@ -11563,6 +11570,13 @@
   <p:clrMapOvr>
     <a:masterClrMapping/>
   </p:clrMapOvr>
+  <p:timing>
+    <p:tnLst>
+      <p:par>
+        <p:cTn id="1" dur="indefinite" restart="never" nodeType="tmRoot"/>
+      </p:par>
+    </p:tnLst>
+  </p:timing>
 </p:sld>
 </file>
 
@@ -12077,6 +12091,13 @@
   <p:clrMapOvr>
     <a:masterClrMapping/>
   </p:clrMapOvr>
+  <p:timing>
+    <p:tnLst>
+      <p:par>
+        <p:cTn id="1" dur="indefinite" restart="never" nodeType="tmRoot"/>
+      </p:par>
+    </p:tnLst>
+  </p:timing>
 </p:sld>
 </file>
 
@@ -12377,9 +12398,22 @@
               <a:buAutoNum type="arabicPeriod"/>
             </a:pPr>
             <a:r>
-              <a:rPr lang="en-US" sz="2400" i="0" dirty="0" smtClean="0"/>
-              <a:t>In deep learning, people usually do not add regularization. But for fine-tuning, regularization may help.</a:t>
-            </a:r>
+              <a:rPr lang="en-US" sz="2400" i="0" smtClean="0"/>
+              <a:t>Regularization </a:t>
+            </a:r>
+            <a:r>
+              <a:rPr lang="en-US" sz="2400" i="0"/>
+              <a:t>may help fine-tuning (</a:t>
+            </a:r>
+            <a:r>
+              <a:rPr lang="en-US" sz="2400" i="0"/>
+              <a:t>though </a:t>
+            </a:r>
+            <a:r>
+              <a:rPr lang="en-US" sz="2400" i="0" smtClean="0"/>
+              <a:t>we do not do regularization in general deep learning.)</a:t>
+            </a:r>
+            <a:endParaRPr lang="en-US" sz="2400" i="0" dirty="0" smtClean="0"/>
           </a:p>
         </p:txBody>
       </p:sp>
@@ -12620,6 +12654,13 @@
   <p:clrMapOvr>
     <a:masterClrMapping/>
   </p:clrMapOvr>
+  <p:timing>
+    <p:tnLst>
+      <p:par>
+        <p:cTn id="1" dur="indefinite" restart="never" nodeType="tmRoot"/>
+      </p:par>
+    </p:tnLst>
+  </p:timing>
 </p:sld>
 </file>
 

</xml_diff>

<commit_message>
update the lecture finally
</commit_message>
<xml_diff>
--- a/lecture/lecture10_llcao.pptx
+++ b/lecture/lecture10_llcao.pptx
@@ -12398,19 +12398,15 @@
               <a:buAutoNum type="arabicPeriod"/>
             </a:pPr>
             <a:r>
-              <a:rPr lang="en-US" sz="2400" i="0" smtClean="0"/>
+              <a:rPr lang="en-US" sz="2400" i="0" dirty="0" smtClean="0"/>
               <a:t>Regularization </a:t>
             </a:r>
             <a:r>
-              <a:rPr lang="en-US" sz="2400" i="0"/>
-              <a:t>may help fine-tuning (</a:t>
-            </a:r>
-            <a:r>
-              <a:rPr lang="en-US" sz="2400" i="0"/>
-              <a:t>though </a:t>
-            </a:r>
-            <a:r>
-              <a:rPr lang="en-US" sz="2400" i="0" smtClean="0"/>
+              <a:rPr lang="en-US" sz="2400" i="0" dirty="0"/>
+              <a:t>may help fine-tuning (though </a:t>
+            </a:r>
+            <a:r>
+              <a:rPr lang="en-US" sz="2400" i="0" dirty="0" smtClean="0"/>
               <a:t>we do not do regularization in general deep learning.)</a:t>
             </a:r>
             <a:endParaRPr lang="en-US" sz="2400" i="0" dirty="0" smtClean="0"/>

</xml_diff>